<commit_message>
Update Web Application Automation Test Architecture.pptx
</commit_message>
<xml_diff>
--- a/Web Application Automation Test Architecture.pptx
+++ b/Web Application Automation Test Architecture.pptx
@@ -109,14 +109,6 @@
     </a:lvl9pPr>
   </p:defaultTextStyle>
 </p:presentation>
-</file>
-
-<file path=ppt/revisionInfo.xml><?xml version="1.0" encoding="utf-8"?>
-<p1510:revInfo xmlns:a="http://schemas.openxmlformats.org/drawingml/2006/main" xmlns:r="http://schemas.openxmlformats.org/officeDocument/2006/relationships" xmlns:p1510="http://schemas.microsoft.com/office/powerpoint/2015/10/main">
-  <p1510:revLst>
-    <p1510:client id="{06132B34-4B2A-4A0C-B0C7-6B6E0B7FC3BD}" v="61" dt="2021-10-03T12:09:06.961"/>
-  </p1510:revLst>
-</p1510:revInfo>
 </file>
 
 <file path=ppt/slideLayouts/slideLayout1.xml><?xml version="1.0" encoding="utf-8"?>
@@ -6110,7 +6102,7 @@
           <a:p>
             <a:r>
               <a:rPr lang="en-NZ" sz="3200" dirty="0"/>
-              <a:t>Automation Test for Web Application Architecture</a:t>
+              <a:t>Automation Test Layer Architecture</a:t>
             </a:r>
           </a:p>
         </p:txBody>
@@ -7025,51 +7017,59 @@
           <a:lstStyle/>
           <a:p>
             <a:r>
-              <a:rPr lang="en-NZ" sz="1800" dirty="0"/>
+              <a:rPr lang="en-NZ" sz="2000" dirty="0"/>
               <a:t>Most Web Application development based MVC layer Architecture</a:t>
             </a:r>
           </a:p>
           <a:p>
-            <a:endParaRPr lang="en-NZ" sz="1800" dirty="0"/>
-          </a:p>
-          <a:p>
-            <a:r>
-              <a:rPr lang="en-NZ" sz="1800" dirty="0"/>
+            <a:r>
+              <a:rPr lang="en-NZ" sz="2000" dirty="0"/>
               <a:t>Traditional test script based on the test flow : a flat architecture.</a:t>
             </a:r>
           </a:p>
           <a:p>
-            <a:endParaRPr lang="en-NZ" sz="1800" dirty="0"/>
-          </a:p>
-          <a:p>
-            <a:r>
-              <a:rPr lang="en-NZ" sz="1800" dirty="0"/>
+            <a:r>
+              <a:rPr lang="en-NZ" sz="2000" dirty="0"/>
               <a:t>If web Application development just change one line (Example: Id) but traditional test script has to change all test case including that id.</a:t>
             </a:r>
           </a:p>
           <a:p>
-            <a:endParaRPr lang="en-NZ" sz="1800" dirty="0"/>
-          </a:p>
-          <a:p>
-            <a:r>
-              <a:rPr lang="en-NZ" sz="1800" dirty="0"/>
+            <a:r>
+              <a:rPr lang="en-NZ" sz="2000" dirty="0"/>
               <a:t>Agile or DevOps  change code every day ,need CI/CD daily . Traditional test script can’t meet this requirement.</a:t>
             </a:r>
           </a:p>
           <a:p>
-            <a:endParaRPr lang="en-NZ" sz="1800" dirty="0"/>
-          </a:p>
-          <a:p>
-            <a:r>
-              <a:rPr lang="en-NZ" sz="1800" dirty="0"/>
-              <a:t>The test architecture must align at application development architecture. So that test script can be updated as same complex as application development.</a:t>
-            </a:r>
-          </a:p>
-          <a:p>
-            <a:pPr marL="0" indent="0">
-              <a:buNone/>
-            </a:pPr>
-            <a:endParaRPr lang="en-NZ" sz="1800" dirty="0"/>
+            <a:r>
+              <a:rPr lang="en-NZ" sz="2000" dirty="0"/>
+              <a:t>The test architecture must align with application development architecture. So that test script can be updated as same complex as application development.</a:t>
+            </a:r>
+          </a:p>
+          <a:p>
+            <a:r>
+              <a:rPr lang="en-NZ" sz="2000" dirty="0"/>
+              <a:t>Because Json is </a:t>
+            </a:r>
+            <a:r>
+              <a:rPr lang="zh-CN" altLang="en-US" sz="2000" dirty="0"/>
+              <a:t>“</a:t>
+            </a:r>
+            <a:r>
+              <a:rPr lang="en-US" altLang="zh-CN" sz="2000"/>
+              <a:t>l</a:t>
+            </a:r>
+            <a:r>
+              <a:rPr lang="en-NZ" sz="2000"/>
+              <a:t>ogic</a:t>
+            </a:r>
+            <a:r>
+              <a:rPr lang="zh-CN" altLang="en-US" sz="2000" dirty="0"/>
+              <a:t>”</a:t>
+            </a:r>
+            <a:r>
+              <a:rPr lang="en-NZ" sz="2000" dirty="0"/>
+              <a:t> data structure in web application development, so the test data structure also align to Json.</a:t>
+            </a:r>
           </a:p>
         </p:txBody>
       </p:sp>

</xml_diff>